<commit_message>
fixed path for crt.exe
</commit_message>
<xml_diff>
--- a/presentations/Niswonger/Intro_modflow_D.pptx
+++ b/presentations/Niswonger/Intro_modflow_D.pptx
@@ -5,10 +5,10 @@
     <p:sldMasterId id="2147483648" r:id="rId1"/>
   </p:sldMasterIdLst>
   <p:notesMasterIdLst>
-    <p:notesMasterId r:id="rId18"/>
+    <p:notesMasterId r:id="rId19"/>
   </p:notesMasterIdLst>
   <p:handoutMasterIdLst>
-    <p:handoutMasterId r:id="rId19"/>
+    <p:handoutMasterId r:id="rId20"/>
   </p:handoutMasterIdLst>
   <p:sldIdLst>
     <p:sldId id="476" r:id="rId2"/>
@@ -22,11 +22,12 @@
     <p:sldId id="484" r:id="rId10"/>
     <p:sldId id="485" r:id="rId11"/>
     <p:sldId id="486" r:id="rId12"/>
-    <p:sldId id="487" r:id="rId13"/>
-    <p:sldId id="488" r:id="rId14"/>
-    <p:sldId id="489" r:id="rId15"/>
-    <p:sldId id="490" r:id="rId16"/>
-    <p:sldId id="491" r:id="rId17"/>
+    <p:sldId id="492" r:id="rId13"/>
+    <p:sldId id="487" r:id="rId14"/>
+    <p:sldId id="488" r:id="rId15"/>
+    <p:sldId id="489" r:id="rId16"/>
+    <p:sldId id="490" r:id="rId17"/>
+    <p:sldId id="491" r:id="rId18"/>
   </p:sldIdLst>
   <p:sldSz cx="9144000" cy="6858000" type="screen4x3"/>
   <p:notesSz cx="7315200" cy="9601200"/>
@@ -4950,7 +4951,7 @@
         <p:spPr/>
         <p:txBody>
           <a:bodyPr>
-            <a:normAutofit/>
+            <a:normAutofit fontScale="90000"/>
           </a:bodyPr>
           <a:lstStyle/>
           <a:p>
@@ -4963,7 +4964,76 @@
                   <a:schemeClr val="bg1"/>
                 </a:solidFill>
               </a:rPr>
-              <a:t>Channel Flow (SFR)</a:t>
+              <a:t>NHD+ Networks not Consistent with Resampled DEM (Model Top)</a:t>
+            </a:r>
+          </a:p>
+        </p:txBody>
+      </p:sp>
+      <p:pic>
+        <p:nvPicPr>
+          <p:cNvPr id="2" name="Picture 1">
+            <a:extLst>
+              <a:ext uri="{FF2B5EF4-FFF2-40B4-BE49-F238E27FC236}">
+                <a16:creationId xmlns:a16="http://schemas.microsoft.com/office/drawing/2014/main" id="{C1C8AE83-3633-4A68-9EA1-11B0FCD49364}"/>
+              </a:ext>
+            </a:extLst>
+          </p:cNvPr>
+          <p:cNvPicPr>
+            <a:picLocks noChangeAspect="1"/>
+          </p:cNvPicPr>
+          <p:nvPr/>
+        </p:nvPicPr>
+        <p:blipFill>
+          <a:blip r:embed="rId2"/>
+          <a:stretch>
+            <a:fillRect/>
+          </a:stretch>
+        </p:blipFill>
+        <p:spPr>
+          <a:xfrm>
+            <a:off x="1357255" y="3132675"/>
+            <a:ext cx="6600130" cy="3003431"/>
+          </a:xfrm>
+          <a:prstGeom prst="rect">
+            <a:avLst/>
+          </a:prstGeom>
+        </p:spPr>
+      </p:pic>
+      <p:sp>
+        <p:nvSpPr>
+          <p:cNvPr id="3" name="TextBox 2">
+            <a:extLst>
+              <a:ext uri="{FF2B5EF4-FFF2-40B4-BE49-F238E27FC236}">
+                <a16:creationId xmlns:a16="http://schemas.microsoft.com/office/drawing/2014/main" id="{7C1E3693-FFAE-4152-AE1A-5210B11BC992}"/>
+              </a:ext>
+            </a:extLst>
+          </p:cNvPr>
+          <p:cNvSpPr txBox="1"/>
+          <p:nvPr/>
+        </p:nvSpPr>
+        <p:spPr>
+          <a:xfrm>
+            <a:off x="3561146" y="2550694"/>
+            <a:ext cx="2021707" cy="461665"/>
+          </a:xfrm>
+          <a:prstGeom prst="rect">
+            <a:avLst/>
+          </a:prstGeom>
+          <a:noFill/>
+        </p:spPr>
+        <p:txBody>
+          <a:bodyPr wrap="none" rtlCol="0">
+            <a:spAutoFit/>
+          </a:bodyPr>
+          <a:lstStyle/>
+          <a:p>
+            <a:r>
+              <a:rPr lang="en-US" dirty="0">
+                <a:solidFill>
+                  <a:schemeClr val="bg1"/>
+                </a:solidFill>
+              </a:rPr>
+              <a:t>Circular Flows</a:t>
             </a:r>
           </a:p>
         </p:txBody>
@@ -5012,7 +5082,7 @@
         <p:spPr/>
         <p:txBody>
           <a:bodyPr>
-            <a:normAutofit/>
+            <a:normAutofit fontScale="90000"/>
           </a:bodyPr>
           <a:lstStyle/>
           <a:p>
@@ -5025,126 +5095,17 @@
                   <a:schemeClr val="bg1"/>
                 </a:solidFill>
               </a:rPr>
-              <a:t>Channel Flow (SFR)</a:t>
-            </a:r>
-          </a:p>
-        </p:txBody>
-      </p:sp>
-      <p:sp>
-        <p:nvSpPr>
-          <p:cNvPr id="3" name="Rectangle 3">
-            <a:extLst>
-              <a:ext uri="{FF2B5EF4-FFF2-40B4-BE49-F238E27FC236}">
-                <a16:creationId xmlns:a16="http://schemas.microsoft.com/office/drawing/2014/main" id="{5A270DAA-7EE8-4B98-B71E-23431D45F8DA}"/>
-              </a:ext>
-            </a:extLst>
-          </p:cNvPr>
-          <p:cNvSpPr>
-            <a:spLocks noGrp="1" noChangeArrowheads="1"/>
-          </p:cNvSpPr>
-          <p:nvPr>
-            <p:ph idx="1"/>
-          </p:nvPr>
-        </p:nvSpPr>
-        <p:spPr>
-          <a:xfrm>
-            <a:off x="152400" y="2743200"/>
-            <a:ext cx="3429000" cy="1676400"/>
-          </a:xfrm>
-        </p:spPr>
-        <p:txBody>
-          <a:bodyPr>
-            <a:normAutofit fontScale="55000" lnSpcReduction="20000"/>
-          </a:bodyPr>
-          <a:lstStyle/>
-          <a:p>
-            <a:pPr eaLnBrk="1" hangingPunct="1">
-              <a:buClr>
-                <a:schemeClr val="bg1"/>
-              </a:buClr>
-              <a:buSzPct val="180000"/>
-            </a:pPr>
-            <a:r>
-              <a:rPr lang="en-US" dirty="0">
-                <a:solidFill>
-                  <a:schemeClr val="bg1"/>
-                </a:solidFill>
-                <a:latin typeface="Arial" charset="0"/>
-              </a:rPr>
-              <a:t>Solves steady-flow</a:t>
-            </a:r>
-          </a:p>
-          <a:p>
-            <a:pPr marL="0" indent="0" eaLnBrk="1" hangingPunct="1">
-              <a:buClr>
-                <a:schemeClr val="bg1"/>
-              </a:buClr>
-              <a:buSzPct val="180000"/>
-              <a:buNone/>
-            </a:pPr>
-            <a:endParaRPr lang="en-US" dirty="0">
-              <a:solidFill>
-                <a:schemeClr val="bg1"/>
-              </a:solidFill>
-              <a:latin typeface="Arial" charset="0"/>
-            </a:endParaRPr>
-          </a:p>
-          <a:p>
-            <a:pPr eaLnBrk="1" hangingPunct="1">
-              <a:buClr>
-                <a:schemeClr val="bg1"/>
-              </a:buClr>
-              <a:buSzPct val="180000"/>
-            </a:pPr>
-            <a:r>
-              <a:rPr lang="en-US" dirty="0">
-                <a:solidFill>
-                  <a:schemeClr val="bg1"/>
-                </a:solidFill>
-                <a:latin typeface="Arial" charset="0"/>
-              </a:rPr>
-              <a:t>Kinematic-wave</a:t>
-            </a:r>
-          </a:p>
-          <a:p>
-            <a:pPr eaLnBrk="1" hangingPunct="1">
-              <a:buClr>
-                <a:schemeClr val="bg1"/>
-              </a:buClr>
-              <a:buSzPct val="180000"/>
-            </a:pPr>
-            <a:endParaRPr lang="en-US" dirty="0">
-              <a:solidFill>
-                <a:schemeClr val="bg1"/>
-              </a:solidFill>
-              <a:latin typeface="Arial" charset="0"/>
-            </a:endParaRPr>
-          </a:p>
-          <a:p>
-            <a:pPr eaLnBrk="1" hangingPunct="1">
-              <a:buClr>
-                <a:schemeClr val="bg1"/>
-              </a:buClr>
-              <a:buSzPct val="180000"/>
-            </a:pPr>
-            <a:r>
-              <a:rPr lang="en-US" dirty="0">
-                <a:solidFill>
-                  <a:schemeClr val="bg1"/>
-                </a:solidFill>
-                <a:latin typeface="Arial" charset="0"/>
-              </a:rPr>
-              <a:t>Diversions, releases, floodplain</a:t>
+              <a:t>NHD+ Networks not Consistent with Resampled DEM (Model Top)</a:t>
             </a:r>
           </a:p>
         </p:txBody>
       </p:sp>
       <p:pic>
         <p:nvPicPr>
-          <p:cNvPr id="4" name="Picture 30">
+          <p:cNvPr id="5" name="Picture 5">
             <a:extLst>
               <a:ext uri="{FF2B5EF4-FFF2-40B4-BE49-F238E27FC236}">
-                <a16:creationId xmlns:a16="http://schemas.microsoft.com/office/drawing/2014/main" id="{47240E35-F86C-487A-985C-6F4E84DB58CB}"/>
+                <a16:creationId xmlns:a16="http://schemas.microsoft.com/office/drawing/2014/main" id="{30C9D6DC-6FBA-4201-8BC6-891A3A95E852}"/>
               </a:ext>
             </a:extLst>
           </p:cNvPr>
@@ -5154,7 +5115,13 @@
           <p:nvPr/>
         </p:nvPicPr>
         <p:blipFill>
-          <a:blip r:embed="rId2"/>
+          <a:blip r:embed="rId2" cstate="print">
+            <a:extLst>
+              <a:ext uri="{28A0092B-C50C-407E-A947-70E740481C1C}">
+                <a14:useLocalDpi xmlns:a14="http://schemas.microsoft.com/office/drawing/2010/main" val="0"/>
+              </a:ext>
+            </a:extLst>
+          </a:blip>
           <a:srcRect/>
           <a:stretch>
             <a:fillRect/>
@@ -5162,25 +5129,372 @@
         </p:blipFill>
         <p:spPr bwMode="auto">
           <a:xfrm>
-            <a:off x="3510511" y="2456916"/>
-            <a:ext cx="5483225" cy="3578225"/>
+            <a:off x="4956108" y="2329724"/>
+            <a:ext cx="1733550" cy="1484772"/>
           </a:xfrm>
           <a:prstGeom prst="rect">
             <a:avLst/>
           </a:prstGeom>
           <a:noFill/>
-          <a:ln w="9525">
+          <a:ln>
             <a:noFill/>
-            <a:miter lim="800000"/>
-            <a:headEnd/>
-            <a:tailEnd/>
+          </a:ln>
+          <a:extLst>
+            <a:ext uri="{909E8E84-426E-40DD-AFC4-6F175D3DCCD1}">
+              <a14:hiddenFill xmlns:a14="http://schemas.microsoft.com/office/drawing/2010/main">
+                <a:solidFill>
+                  <a:schemeClr val="accent1"/>
+                </a:solidFill>
+              </a14:hiddenFill>
+            </a:ext>
+            <a:ext uri="{91240B29-F687-4F45-9708-019B960494DF}">
+              <a14:hiddenLine xmlns:a14="http://schemas.microsoft.com/office/drawing/2010/main" w="9525">
+                <a:solidFill>
+                  <a:schemeClr val="tx1"/>
+                </a:solidFill>
+                <a:miter lim="800000"/>
+                <a:headEnd/>
+                <a:tailEnd/>
+              </a14:hiddenLine>
+            </a:ext>
+          </a:extLst>
+        </p:spPr>
+      </p:pic>
+      <p:pic>
+        <p:nvPicPr>
+          <p:cNvPr id="6" name="Picture 4">
+            <a:extLst>
+              <a:ext uri="{FF2B5EF4-FFF2-40B4-BE49-F238E27FC236}">
+                <a16:creationId xmlns:a16="http://schemas.microsoft.com/office/drawing/2014/main" id="{CE9E5748-9873-4E35-81F0-33A97CC06AFC}"/>
+              </a:ext>
+            </a:extLst>
+          </p:cNvPr>
+          <p:cNvPicPr>
+            <a:picLocks noChangeAspect="1" noChangeArrowheads="1"/>
+          </p:cNvPicPr>
+          <p:nvPr/>
+        </p:nvPicPr>
+        <p:blipFill rotWithShape="1">
+          <a:blip r:embed="rId3">
+            <a:extLst>
+              <a:ext uri="{28A0092B-C50C-407E-A947-70E740481C1C}">
+                <a14:useLocalDpi xmlns:a14="http://schemas.microsoft.com/office/drawing/2010/main" val="0"/>
+              </a:ext>
+            </a:extLst>
+          </a:blip>
+          <a:srcRect l="31652" b="34898"/>
+          <a:stretch/>
+        </p:blipFill>
+        <p:spPr bwMode="auto">
+          <a:xfrm>
+            <a:off x="1854524" y="2209801"/>
+            <a:ext cx="2908226" cy="2895600"/>
+          </a:xfrm>
+          <a:prstGeom prst="rect">
+            <a:avLst/>
+          </a:prstGeom>
+          <a:noFill/>
+          <a:ln>
+            <a:noFill/>
+          </a:ln>
+          <a:extLst>
+            <a:ext uri="{909E8E84-426E-40DD-AFC4-6F175D3DCCD1}">
+              <a14:hiddenFill xmlns:a14="http://schemas.microsoft.com/office/drawing/2010/main">
+                <a:solidFill>
+                  <a:schemeClr val="accent1"/>
+                </a:solidFill>
+              </a14:hiddenFill>
+            </a:ext>
+            <a:ext uri="{91240B29-F687-4F45-9708-019B960494DF}">
+              <a14:hiddenLine xmlns:a14="http://schemas.microsoft.com/office/drawing/2010/main" w="9525">
+                <a:solidFill>
+                  <a:schemeClr val="tx1"/>
+                </a:solidFill>
+                <a:miter lim="800000"/>
+                <a:headEnd/>
+                <a:tailEnd/>
+              </a14:hiddenLine>
+            </a:ext>
+          </a:extLst>
+        </p:spPr>
+      </p:pic>
+      <p:cxnSp>
+        <p:nvCxnSpPr>
+          <p:cNvPr id="7" name="Straight Arrow Connector 6">
+            <a:extLst>
+              <a:ext uri="{FF2B5EF4-FFF2-40B4-BE49-F238E27FC236}">
+                <a16:creationId xmlns:a16="http://schemas.microsoft.com/office/drawing/2014/main" id="{6181E887-9BA6-4BD0-8EEA-C2057CB4D3E5}"/>
+              </a:ext>
+            </a:extLst>
+          </p:cNvPr>
+          <p:cNvCxnSpPr>
+            <a:cxnSpLocks/>
+          </p:cNvCxnSpPr>
+          <p:nvPr/>
+        </p:nvCxnSpPr>
+        <p:spPr>
+          <a:xfrm flipV="1">
+            <a:off x="5720489" y="3124201"/>
+            <a:ext cx="102394" cy="914400"/>
+          </a:xfrm>
+          <a:prstGeom prst="straightConnector1">
+            <a:avLst/>
+          </a:prstGeom>
+          <a:ln w="19050">
+            <a:solidFill>
+              <a:schemeClr val="bg1"/>
+            </a:solidFill>
+            <a:tailEnd type="arrow"/>
           </a:ln>
         </p:spPr>
-      </p:pic>
+        <p:style>
+          <a:lnRef idx="1">
+            <a:schemeClr val="accent1"/>
+          </a:lnRef>
+          <a:fillRef idx="0">
+            <a:schemeClr val="accent1"/>
+          </a:fillRef>
+          <a:effectRef idx="0">
+            <a:schemeClr val="accent1"/>
+          </a:effectRef>
+          <a:fontRef idx="minor">
+            <a:schemeClr val="tx1"/>
+          </a:fontRef>
+        </p:style>
+      </p:cxnSp>
+      <p:sp>
+        <p:nvSpPr>
+          <p:cNvPr id="8" name="TextBox 7">
+            <a:extLst>
+              <a:ext uri="{FF2B5EF4-FFF2-40B4-BE49-F238E27FC236}">
+                <a16:creationId xmlns:a16="http://schemas.microsoft.com/office/drawing/2014/main" id="{34029856-5784-4962-A422-645373B7A020}"/>
+              </a:ext>
+            </a:extLst>
+          </p:cNvPr>
+          <p:cNvSpPr txBox="1"/>
+          <p:nvPr/>
+        </p:nvSpPr>
+        <p:spPr>
+          <a:xfrm>
+            <a:off x="4900863" y="3960886"/>
+            <a:ext cx="2590800" cy="1938992"/>
+          </a:xfrm>
+          <a:prstGeom prst="rect">
+            <a:avLst/>
+          </a:prstGeom>
+          <a:noFill/>
+        </p:spPr>
+        <p:txBody>
+          <a:bodyPr wrap="square" rtlCol="0">
+            <a:spAutoFit/>
+          </a:bodyPr>
+          <a:lstStyle/>
+          <a:p>
+            <a:r>
+              <a:rPr lang="en-US" dirty="0">
+                <a:solidFill>
+                  <a:schemeClr val="bg1"/>
+                </a:solidFill>
+              </a:rPr>
+              <a:t>NHD streams cut across cells above the stream canyon defined by model cells</a:t>
+            </a:r>
+          </a:p>
+        </p:txBody>
+      </p:sp>
+      <p:sp>
+        <p:nvSpPr>
+          <p:cNvPr id="9" name="Rectangle 8">
+            <a:extLst>
+              <a:ext uri="{FF2B5EF4-FFF2-40B4-BE49-F238E27FC236}">
+                <a16:creationId xmlns:a16="http://schemas.microsoft.com/office/drawing/2014/main" id="{38CA7937-1830-43E3-A533-9CE7656934BC}"/>
+              </a:ext>
+            </a:extLst>
+          </p:cNvPr>
+          <p:cNvSpPr/>
+          <p:nvPr/>
+        </p:nvSpPr>
+        <p:spPr>
+          <a:xfrm>
+            <a:off x="3529263" y="3191592"/>
+            <a:ext cx="381000" cy="419100"/>
+          </a:xfrm>
+          <a:prstGeom prst="rect">
+            <a:avLst/>
+          </a:prstGeom>
+          <a:noFill/>
+          <a:ln w="19050">
+            <a:solidFill>
+              <a:schemeClr val="bg1"/>
+            </a:solidFill>
+          </a:ln>
+        </p:spPr>
+        <p:style>
+          <a:lnRef idx="2">
+            <a:schemeClr val="accent1">
+              <a:shade val="50000"/>
+            </a:schemeClr>
+          </a:lnRef>
+          <a:fillRef idx="1">
+            <a:schemeClr val="accent1"/>
+          </a:fillRef>
+          <a:effectRef idx="0">
+            <a:schemeClr val="accent1"/>
+          </a:effectRef>
+          <a:fontRef idx="minor">
+            <a:schemeClr val="lt1"/>
+          </a:fontRef>
+        </p:style>
+        <p:txBody>
+          <a:bodyPr rtlCol="0" anchor="ctr"/>
+          <a:lstStyle/>
+          <a:p>
+            <a:pPr algn="ctr"/>
+            <a:endParaRPr lang="en-US"/>
+          </a:p>
+        </p:txBody>
+      </p:sp>
+      <p:cxnSp>
+        <p:nvCxnSpPr>
+          <p:cNvPr id="10" name="Straight Connector 9">
+            <a:extLst>
+              <a:ext uri="{FF2B5EF4-FFF2-40B4-BE49-F238E27FC236}">
+                <a16:creationId xmlns:a16="http://schemas.microsoft.com/office/drawing/2014/main" id="{3908441B-9DE0-44B0-883C-1299EFF7B95F}"/>
+              </a:ext>
+            </a:extLst>
+          </p:cNvPr>
+          <p:cNvCxnSpPr>
+            <a:cxnSpLocks/>
+          </p:cNvCxnSpPr>
+          <p:nvPr/>
+        </p:nvCxnSpPr>
+        <p:spPr>
+          <a:xfrm flipV="1">
+            <a:off x="3910263" y="2315292"/>
+            <a:ext cx="1045845" cy="880614"/>
+          </a:xfrm>
+          <a:prstGeom prst="line">
+            <a:avLst/>
+          </a:prstGeom>
+          <a:ln w="19050">
+            <a:solidFill>
+              <a:schemeClr val="bg1"/>
+            </a:solidFill>
+          </a:ln>
+        </p:spPr>
+        <p:style>
+          <a:lnRef idx="1">
+            <a:schemeClr val="accent1"/>
+          </a:lnRef>
+          <a:fillRef idx="0">
+            <a:schemeClr val="accent1"/>
+          </a:fillRef>
+          <a:effectRef idx="0">
+            <a:schemeClr val="accent1"/>
+          </a:effectRef>
+          <a:fontRef idx="minor">
+            <a:schemeClr val="tx1"/>
+          </a:fontRef>
+        </p:style>
+      </p:cxnSp>
+      <p:cxnSp>
+        <p:nvCxnSpPr>
+          <p:cNvPr id="11" name="Straight Connector 10">
+            <a:extLst>
+              <a:ext uri="{FF2B5EF4-FFF2-40B4-BE49-F238E27FC236}">
+                <a16:creationId xmlns:a16="http://schemas.microsoft.com/office/drawing/2014/main" id="{D128F0C5-F1AB-4168-8BBF-AFB4DF2A0659}"/>
+              </a:ext>
+            </a:extLst>
+          </p:cNvPr>
+          <p:cNvCxnSpPr>
+            <a:cxnSpLocks/>
+          </p:cNvCxnSpPr>
+          <p:nvPr/>
+        </p:nvCxnSpPr>
+        <p:spPr>
+          <a:xfrm>
+            <a:off x="3910263" y="3610692"/>
+            <a:ext cx="1045845" cy="199309"/>
+          </a:xfrm>
+          <a:prstGeom prst="line">
+            <a:avLst/>
+          </a:prstGeom>
+          <a:ln w="19050">
+            <a:solidFill>
+              <a:schemeClr val="bg1"/>
+            </a:solidFill>
+          </a:ln>
+        </p:spPr>
+        <p:style>
+          <a:lnRef idx="1">
+            <a:schemeClr val="accent1"/>
+          </a:lnRef>
+          <a:fillRef idx="0">
+            <a:schemeClr val="accent1"/>
+          </a:fillRef>
+          <a:effectRef idx="0">
+            <a:schemeClr val="accent1"/>
+          </a:effectRef>
+          <a:fontRef idx="minor">
+            <a:schemeClr val="tx1"/>
+          </a:fontRef>
+        </p:style>
+      </p:cxnSp>
+      <p:sp>
+        <p:nvSpPr>
+          <p:cNvPr id="12" name="Rectangle 11">
+            <a:extLst>
+              <a:ext uri="{FF2B5EF4-FFF2-40B4-BE49-F238E27FC236}">
+                <a16:creationId xmlns:a16="http://schemas.microsoft.com/office/drawing/2014/main" id="{F6E47D21-FF18-46BD-A02D-F0A5A3F79933}"/>
+              </a:ext>
+            </a:extLst>
+          </p:cNvPr>
+          <p:cNvSpPr/>
+          <p:nvPr/>
+        </p:nvSpPr>
+        <p:spPr>
+          <a:xfrm>
+            <a:off x="4956108" y="2325229"/>
+            <a:ext cx="1733550" cy="1484772"/>
+          </a:xfrm>
+          <a:prstGeom prst="rect">
+            <a:avLst/>
+          </a:prstGeom>
+          <a:noFill/>
+          <a:ln w="19050">
+            <a:solidFill>
+              <a:schemeClr val="tx1"/>
+            </a:solidFill>
+          </a:ln>
+        </p:spPr>
+        <p:style>
+          <a:lnRef idx="2">
+            <a:schemeClr val="accent1">
+              <a:shade val="50000"/>
+            </a:schemeClr>
+          </a:lnRef>
+          <a:fillRef idx="1">
+            <a:schemeClr val="accent1"/>
+          </a:fillRef>
+          <a:effectRef idx="0">
+            <a:schemeClr val="accent1"/>
+          </a:effectRef>
+          <a:fontRef idx="minor">
+            <a:schemeClr val="lt1"/>
+          </a:fontRef>
+        </p:style>
+        <p:txBody>
+          <a:bodyPr rtlCol="0" anchor="ctr"/>
+          <a:lstStyle/>
+          <a:p>
+            <a:pPr algn="ctr"/>
+            <a:endParaRPr lang="en-US"/>
+          </a:p>
+        </p:txBody>
+      </p:sp>
     </p:spTree>
     <p:extLst>
       <p:ext uri="{BB962C8B-B14F-4D97-AF65-F5344CB8AC3E}">
-        <p14:creationId xmlns:p14="http://schemas.microsoft.com/office/powerpoint/2010/main" val="473739461"/>
+        <p14:creationId xmlns:p14="http://schemas.microsoft.com/office/powerpoint/2010/main" val="1377639225"/>
       </p:ext>
     </p:extLst>
   </p:cSld>
@@ -5218,10 +5532,15 @@
             <p:ph type="title"/>
           </p:nvPr>
         </p:nvSpPr>
-        <p:spPr/>
+        <p:spPr>
+          <a:xfrm>
+            <a:off x="685800" y="565212"/>
+            <a:ext cx="7772400" cy="1143000"/>
+          </a:xfrm>
+        </p:spPr>
         <p:txBody>
           <a:bodyPr>
-            <a:normAutofit/>
+            <a:normAutofit fontScale="90000"/>
           </a:bodyPr>
           <a:lstStyle/>
           <a:p>
@@ -5234,126 +5553,90 @@
                   <a:schemeClr val="bg1"/>
                 </a:solidFill>
               </a:rPr>
-              <a:t>Channel Flow (SFR)</a:t>
+              <a:t>Difficulties Developing Stream Networks</a:t>
             </a:r>
           </a:p>
         </p:txBody>
       </p:sp>
       <p:sp>
         <p:nvSpPr>
-          <p:cNvPr id="3" name="Rectangle 3">
+          <p:cNvPr id="7" name="TextBox 6">
             <a:extLst>
               <a:ext uri="{FF2B5EF4-FFF2-40B4-BE49-F238E27FC236}">
-                <a16:creationId xmlns:a16="http://schemas.microsoft.com/office/drawing/2014/main" id="{5A270DAA-7EE8-4B98-B71E-23431D45F8DA}"/>
+                <a16:creationId xmlns:a16="http://schemas.microsoft.com/office/drawing/2014/main" id="{CDAB2DBE-FF16-4195-810A-931CC17C3016}"/>
               </a:ext>
             </a:extLst>
           </p:cNvPr>
-          <p:cNvSpPr>
-            <a:spLocks noGrp="1" noChangeArrowheads="1"/>
-          </p:cNvSpPr>
-          <p:nvPr>
-            <p:ph idx="1"/>
-          </p:nvPr>
+          <p:cNvSpPr txBox="1"/>
+          <p:nvPr/>
         </p:nvSpPr>
         <p:spPr>
           <a:xfrm>
-            <a:off x="152400" y="2743200"/>
-            <a:ext cx="3429000" cy="1676400"/>
+            <a:off x="999001" y="1633835"/>
+            <a:ext cx="6963900" cy="1569660"/>
           </a:xfrm>
+          <a:prstGeom prst="rect">
+            <a:avLst/>
+          </a:prstGeom>
+          <a:noFill/>
         </p:spPr>
         <p:txBody>
-          <a:bodyPr>
-            <a:normAutofit fontScale="55000" lnSpcReduction="20000"/>
+          <a:bodyPr wrap="square" rtlCol="0">
+            <a:spAutoFit/>
           </a:bodyPr>
           <a:lstStyle/>
           <a:p>
-            <a:pPr eaLnBrk="1" hangingPunct="1">
-              <a:buClr>
-                <a:schemeClr val="bg1"/>
-              </a:buClr>
-              <a:buSzPct val="180000"/>
+            <a:pPr marL="342900" indent="-342900">
+              <a:buFont typeface="Arial" panose="020B0604020202020204" pitchFamily="34" charset="0"/>
+              <a:buChar char="•"/>
             </a:pPr>
             <a:r>
               <a:rPr lang="en-US" dirty="0">
                 <a:solidFill>
                   <a:schemeClr val="bg1"/>
                 </a:solidFill>
-                <a:latin typeface="Arial" charset="0"/>
               </a:rPr>
-              <a:t>Solves steady-flow</a:t>
+              <a:t>Alternatively, use </a:t>
             </a:r>
-          </a:p>
-          <a:p>
-            <a:pPr marL="0" indent="0" eaLnBrk="1" hangingPunct="1">
-              <a:buClr>
-                <a:schemeClr val="bg1"/>
-              </a:buClr>
-              <a:buSzPct val="180000"/>
-              <a:buNone/>
-            </a:pPr>
-            <a:endParaRPr lang="en-US" dirty="0">
-              <a:solidFill>
-                <a:schemeClr val="bg1"/>
-              </a:solidFill>
-              <a:latin typeface="Arial" charset="0"/>
-            </a:endParaRPr>
-          </a:p>
-          <a:p>
-            <a:pPr eaLnBrk="1" hangingPunct="1">
-              <a:buClr>
-                <a:schemeClr val="bg1"/>
-              </a:buClr>
-              <a:buSzPct val="180000"/>
+            <a:r>
+              <a:rPr lang="en-US" dirty="0" err="1">
+                <a:solidFill>
+                  <a:schemeClr val="bg1"/>
+                </a:solidFill>
+              </a:rPr>
+              <a:t>ArcHydro</a:t>
+            </a:r>
+            <a:r>
+              <a:rPr lang="en-US" dirty="0">
+                <a:solidFill>
+                  <a:schemeClr val="bg1"/>
+                </a:solidFill>
+              </a:rPr>
+              <a:t> flow direction (FD) and flow accumulation (FA) tools based on model cell altitudes.</a:t>
+            </a:r>
+          </a:p>
+          <a:p>
+            <a:pPr marL="342900" indent="-342900">
+              <a:buFont typeface="Arial" panose="020B0604020202020204" pitchFamily="34" charset="0"/>
+              <a:buChar char="•"/>
             </a:pPr>
             <a:r>
               <a:rPr lang="en-US" dirty="0">
                 <a:solidFill>
                   <a:schemeClr val="bg1"/>
                 </a:solidFill>
-                <a:latin typeface="Arial" charset="0"/>
               </a:rPr>
-              <a:t>Kinematic-wave</a:t>
-            </a:r>
-          </a:p>
-          <a:p>
-            <a:pPr eaLnBrk="1" hangingPunct="1">
-              <a:buClr>
-                <a:schemeClr val="bg1"/>
-              </a:buClr>
-              <a:buSzPct val="180000"/>
-            </a:pPr>
-            <a:endParaRPr lang="en-US" dirty="0">
-              <a:solidFill>
-                <a:schemeClr val="bg1"/>
-              </a:solidFill>
-              <a:latin typeface="Arial" charset="0"/>
-            </a:endParaRPr>
-          </a:p>
-          <a:p>
-            <a:pPr eaLnBrk="1" hangingPunct="1">
-              <a:buClr>
-                <a:schemeClr val="bg1"/>
-              </a:buClr>
-              <a:buSzPct val="180000"/>
-            </a:pPr>
-            <a:r>
-              <a:rPr lang="en-US" dirty="0">
-                <a:solidFill>
-                  <a:schemeClr val="bg1"/>
-                </a:solidFill>
-                <a:latin typeface="Arial" charset="0"/>
-              </a:rPr>
-              <a:t>Diversions, releases, floodplain</a:t>
+              <a:t>This causes problems in flat areas</a:t>
             </a:r>
           </a:p>
         </p:txBody>
       </p:sp>
       <p:pic>
         <p:nvPicPr>
-          <p:cNvPr id="4" name="Picture 30">
+          <p:cNvPr id="8" name="Picture 2">
             <a:extLst>
               <a:ext uri="{FF2B5EF4-FFF2-40B4-BE49-F238E27FC236}">
-                <a16:creationId xmlns:a16="http://schemas.microsoft.com/office/drawing/2014/main" id="{47240E35-F86C-487A-985C-6F4E84DB58CB}"/>
+                <a16:creationId xmlns:a16="http://schemas.microsoft.com/office/drawing/2014/main" id="{4AEB4F35-530F-4535-A4AF-42E44633B676}"/>
               </a:ext>
             </a:extLst>
           </p:cNvPr>
@@ -5363,7 +5646,13 @@
           <p:nvPr/>
         </p:nvPicPr>
         <p:blipFill>
-          <a:blip r:embed="rId2"/>
+          <a:blip r:embed="rId2">
+            <a:extLst>
+              <a:ext uri="{28A0092B-C50C-407E-A947-70E740481C1C}">
+                <a14:useLocalDpi xmlns:a14="http://schemas.microsoft.com/office/drawing/2010/main" val="0"/>
+              </a:ext>
+            </a:extLst>
+          </a:blip>
           <a:srcRect/>
           <a:stretch>
             <a:fillRect/>
@@ -5371,25 +5660,41 @@
         </p:blipFill>
         <p:spPr bwMode="auto">
           <a:xfrm>
-            <a:off x="3510511" y="2456916"/>
-            <a:ext cx="5483225" cy="3578225"/>
+            <a:off x="2133600" y="3352800"/>
+            <a:ext cx="4145129" cy="3352800"/>
           </a:xfrm>
           <a:prstGeom prst="rect">
             <a:avLst/>
           </a:prstGeom>
           <a:noFill/>
-          <a:ln w="9525">
+          <a:ln>
             <a:noFill/>
-            <a:miter lim="800000"/>
-            <a:headEnd/>
-            <a:tailEnd/>
           </a:ln>
+          <a:extLst>
+            <a:ext uri="{909E8E84-426E-40DD-AFC4-6F175D3DCCD1}">
+              <a14:hiddenFill xmlns:a14="http://schemas.microsoft.com/office/drawing/2010/main">
+                <a:solidFill>
+                  <a:schemeClr val="accent1"/>
+                </a:solidFill>
+              </a14:hiddenFill>
+            </a:ext>
+            <a:ext uri="{91240B29-F687-4F45-9708-019B960494DF}">
+              <a14:hiddenLine xmlns:a14="http://schemas.microsoft.com/office/drawing/2010/main" w="9525">
+                <a:solidFill>
+                  <a:schemeClr val="tx1"/>
+                </a:solidFill>
+                <a:miter lim="800000"/>
+                <a:headEnd/>
+                <a:tailEnd/>
+              </a14:hiddenLine>
+            </a:ext>
+          </a:extLst>
         </p:spPr>
       </p:pic>
     </p:spTree>
     <p:extLst>
       <p:ext uri="{BB962C8B-B14F-4D97-AF65-F5344CB8AC3E}">
-        <p14:creationId xmlns:p14="http://schemas.microsoft.com/office/powerpoint/2010/main" val="3726290282"/>
+        <p14:creationId xmlns:p14="http://schemas.microsoft.com/office/powerpoint/2010/main" val="473739461"/>
       </p:ext>
     </p:extLst>
   </p:cSld>
@@ -5427,7 +5732,12 @@
             <p:ph type="title"/>
           </p:nvPr>
         </p:nvSpPr>
-        <p:spPr/>
+        <p:spPr>
+          <a:xfrm>
+            <a:off x="685800" y="413047"/>
+            <a:ext cx="7772400" cy="1143000"/>
+          </a:xfrm>
+        </p:spPr>
         <p:txBody>
           <a:bodyPr>
             <a:normAutofit/>
@@ -5443,126 +5753,33 @@
                   <a:schemeClr val="bg1"/>
                 </a:solidFill>
               </a:rPr>
-              <a:t>Channel Flow (SFR)</a:t>
+              <a:t>Hybrid NHD/</a:t>
             </a:r>
-          </a:p>
-        </p:txBody>
-      </p:sp>
-      <p:sp>
-        <p:nvSpPr>
-          <p:cNvPr id="3" name="Rectangle 3">
-            <a:extLst>
-              <a:ext uri="{FF2B5EF4-FFF2-40B4-BE49-F238E27FC236}">
-                <a16:creationId xmlns:a16="http://schemas.microsoft.com/office/drawing/2014/main" id="{5A270DAA-7EE8-4B98-B71E-23431D45F8DA}"/>
-              </a:ext>
-            </a:extLst>
-          </p:cNvPr>
-          <p:cNvSpPr>
-            <a:spLocks noGrp="1" noChangeArrowheads="1"/>
-          </p:cNvSpPr>
-          <p:nvPr>
-            <p:ph idx="1"/>
-          </p:nvPr>
-        </p:nvSpPr>
-        <p:spPr>
-          <a:xfrm>
-            <a:off x="152400" y="2743200"/>
-            <a:ext cx="3429000" cy="1676400"/>
-          </a:xfrm>
-        </p:spPr>
-        <p:txBody>
-          <a:bodyPr>
-            <a:normAutofit fontScale="55000" lnSpcReduction="20000"/>
-          </a:bodyPr>
-          <a:lstStyle/>
-          <a:p>
-            <a:pPr eaLnBrk="1" hangingPunct="1">
-              <a:buClr>
-                <a:schemeClr val="bg1"/>
-              </a:buClr>
-              <a:buSzPct val="180000"/>
-            </a:pPr>
             <a:r>
-              <a:rPr lang="en-US" dirty="0">
+              <a:rPr lang="en-US" sz="4000" dirty="0" err="1">
                 <a:solidFill>
                   <a:schemeClr val="bg1"/>
                 </a:solidFill>
-                <a:latin typeface="Arial" charset="0"/>
               </a:rPr>
-              <a:t>Solves steady-flow</a:t>
+              <a:t>ArcHydro</a:t>
             </a:r>
-          </a:p>
-          <a:p>
-            <a:pPr marL="0" indent="0" eaLnBrk="1" hangingPunct="1">
-              <a:buClr>
-                <a:schemeClr val="bg1"/>
-              </a:buClr>
-              <a:buSzPct val="180000"/>
-              <a:buNone/>
-            </a:pPr>
-            <a:endParaRPr lang="en-US" dirty="0">
-              <a:solidFill>
-                <a:schemeClr val="bg1"/>
-              </a:solidFill>
-              <a:latin typeface="Arial" charset="0"/>
-            </a:endParaRPr>
-          </a:p>
-          <a:p>
-            <a:pPr eaLnBrk="1" hangingPunct="1">
-              <a:buClr>
-                <a:schemeClr val="bg1"/>
-              </a:buClr>
-              <a:buSzPct val="180000"/>
-            </a:pPr>
             <a:r>
-              <a:rPr lang="en-US" dirty="0">
+              <a:rPr lang="en-US" sz="4000" dirty="0">
                 <a:solidFill>
                   <a:schemeClr val="bg1"/>
                 </a:solidFill>
-                <a:latin typeface="Arial" charset="0"/>
               </a:rPr>
-              <a:t>Kinematic-wave</a:t>
-            </a:r>
-          </a:p>
-          <a:p>
-            <a:pPr eaLnBrk="1" hangingPunct="1">
-              <a:buClr>
-                <a:schemeClr val="bg1"/>
-              </a:buClr>
-              <a:buSzPct val="180000"/>
-            </a:pPr>
-            <a:endParaRPr lang="en-US" dirty="0">
-              <a:solidFill>
-                <a:schemeClr val="bg1"/>
-              </a:solidFill>
-              <a:latin typeface="Arial" charset="0"/>
-            </a:endParaRPr>
-          </a:p>
-          <a:p>
-            <a:pPr eaLnBrk="1" hangingPunct="1">
-              <a:buClr>
-                <a:schemeClr val="bg1"/>
-              </a:buClr>
-              <a:buSzPct val="180000"/>
-            </a:pPr>
-            <a:r>
-              <a:rPr lang="en-US" dirty="0">
-                <a:solidFill>
-                  <a:schemeClr val="bg1"/>
-                </a:solidFill>
-                <a:latin typeface="Arial" charset="0"/>
-              </a:rPr>
-              <a:t>Diversions, releases, floodplain</a:t>
+              <a:t> Approach</a:t>
             </a:r>
           </a:p>
         </p:txBody>
       </p:sp>
       <p:pic>
         <p:nvPicPr>
-          <p:cNvPr id="4" name="Picture 30">
+          <p:cNvPr id="7" name="Picture 2">
             <a:extLst>
               <a:ext uri="{FF2B5EF4-FFF2-40B4-BE49-F238E27FC236}">
-                <a16:creationId xmlns:a16="http://schemas.microsoft.com/office/drawing/2014/main" id="{47240E35-F86C-487A-985C-6F4E84DB58CB}"/>
+                <a16:creationId xmlns:a16="http://schemas.microsoft.com/office/drawing/2014/main" id="{612F3DF3-3990-441B-8E92-020646F25B20}"/>
               </a:ext>
             </a:extLst>
           </p:cNvPr>
@@ -5572,7 +5789,13 @@
           <p:nvPr/>
         </p:nvPicPr>
         <p:blipFill>
-          <a:blip r:embed="rId2"/>
+          <a:blip r:embed="rId2">
+            <a:extLst>
+              <a:ext uri="{28A0092B-C50C-407E-A947-70E740481C1C}">
+                <a14:useLocalDpi xmlns:a14="http://schemas.microsoft.com/office/drawing/2010/main" val="0"/>
+              </a:ext>
+            </a:extLst>
+          </a:blip>
           <a:srcRect/>
           <a:stretch>
             <a:fillRect/>
@@ -5580,21 +5803,552 @@
         </p:blipFill>
         <p:spPr bwMode="auto">
           <a:xfrm>
-            <a:off x="3510511" y="2456916"/>
-            <a:ext cx="5483225" cy="3578225"/>
+            <a:off x="685800" y="1752600"/>
+            <a:ext cx="3370792" cy="4953001"/>
           </a:xfrm>
           <a:prstGeom prst="rect">
             <a:avLst/>
           </a:prstGeom>
           <a:noFill/>
-          <a:ln w="9525">
+          <a:ln>
             <a:noFill/>
-            <a:miter lim="800000"/>
-            <a:headEnd/>
-            <a:tailEnd/>
+          </a:ln>
+          <a:extLst>
+            <a:ext uri="{909E8E84-426E-40DD-AFC4-6F175D3DCCD1}">
+              <a14:hiddenFill xmlns:a14="http://schemas.microsoft.com/office/drawing/2010/main">
+                <a:solidFill>
+                  <a:schemeClr val="accent1"/>
+                </a:solidFill>
+              </a14:hiddenFill>
+            </a:ext>
+            <a:ext uri="{91240B29-F687-4F45-9708-019B960494DF}">
+              <a14:hiddenLine xmlns:a14="http://schemas.microsoft.com/office/drawing/2010/main" w="9525">
+                <a:solidFill>
+                  <a:schemeClr val="tx1"/>
+                </a:solidFill>
+                <a:miter lim="800000"/>
+                <a:headEnd/>
+                <a:tailEnd/>
+              </a14:hiddenLine>
+            </a:ext>
+          </a:extLst>
+        </p:spPr>
+      </p:pic>
+      <p:sp>
+        <p:nvSpPr>
+          <p:cNvPr id="8" name="Rectangle 7">
+            <a:extLst>
+              <a:ext uri="{FF2B5EF4-FFF2-40B4-BE49-F238E27FC236}">
+                <a16:creationId xmlns:a16="http://schemas.microsoft.com/office/drawing/2014/main" id="{8538811F-8902-4E00-8AF9-EA1862FFCF9E}"/>
+              </a:ext>
+            </a:extLst>
+          </p:cNvPr>
+          <p:cNvSpPr/>
+          <p:nvPr/>
+        </p:nvSpPr>
+        <p:spPr>
+          <a:xfrm>
+            <a:off x="1619784" y="5106826"/>
+            <a:ext cx="2133600" cy="1524000"/>
+          </a:xfrm>
+          <a:prstGeom prst="rect">
+            <a:avLst/>
+          </a:prstGeom>
+          <a:noFill/>
+          <a:ln w="28575">
+            <a:solidFill>
+              <a:schemeClr val="tx1"/>
+            </a:solidFill>
           </a:ln>
         </p:spPr>
+        <p:style>
+          <a:lnRef idx="2">
+            <a:schemeClr val="accent1">
+              <a:shade val="50000"/>
+            </a:schemeClr>
+          </a:lnRef>
+          <a:fillRef idx="1">
+            <a:schemeClr val="accent1"/>
+          </a:fillRef>
+          <a:effectRef idx="0">
+            <a:schemeClr val="accent1"/>
+          </a:effectRef>
+          <a:fontRef idx="minor">
+            <a:schemeClr val="lt1"/>
+          </a:fontRef>
+        </p:style>
+        <p:txBody>
+          <a:bodyPr rtlCol="0" anchor="ctr"/>
+          <a:lstStyle/>
+          <a:p>
+            <a:pPr algn="ctr"/>
+            <a:endParaRPr lang="en-US"/>
+          </a:p>
+        </p:txBody>
+      </p:sp>
+      <p:sp>
+        <p:nvSpPr>
+          <p:cNvPr id="9" name="Content Placeholder 1">
+            <a:extLst>
+              <a:ext uri="{FF2B5EF4-FFF2-40B4-BE49-F238E27FC236}">
+                <a16:creationId xmlns:a16="http://schemas.microsoft.com/office/drawing/2014/main" id="{7C0FE8F4-F8E1-4075-81E2-41C56AD073FC}"/>
+              </a:ext>
+            </a:extLst>
+          </p:cNvPr>
+          <p:cNvSpPr>
+            <a:spLocks noGrp="1"/>
+          </p:cNvSpPr>
+          <p:nvPr>
+            <p:ph idx="1"/>
+          </p:nvPr>
+        </p:nvSpPr>
+        <p:spPr>
+          <a:xfrm>
+            <a:off x="4504346" y="1752600"/>
+            <a:ext cx="4191000" cy="4572000"/>
+          </a:xfrm>
+        </p:spPr>
+        <p:txBody>
+          <a:bodyPr>
+            <a:normAutofit fontScale="85000" lnSpcReduction="20000"/>
+          </a:bodyPr>
+          <a:lstStyle/>
+          <a:p>
+            <a:r>
+              <a:rPr lang="en-US" dirty="0">
+                <a:solidFill>
+                  <a:schemeClr val="bg1"/>
+                </a:solidFill>
+              </a:rPr>
+              <a:t>Sequential process</a:t>
+            </a:r>
+          </a:p>
+          <a:p>
+            <a:r>
+              <a:rPr lang="en-US" dirty="0">
+                <a:solidFill>
+                  <a:schemeClr val="bg1"/>
+                </a:solidFill>
+              </a:rPr>
+              <a:t>Buffer model cells around NHD streams (4 cells wide)</a:t>
+            </a:r>
+          </a:p>
+          <a:p>
+            <a:r>
+              <a:rPr lang="en-US" dirty="0">
+                <a:solidFill>
+                  <a:schemeClr val="bg1"/>
+                </a:solidFill>
+              </a:rPr>
+              <a:t>Apply DEM (model scale) conditioning (CRT), assure continuous down-sloping paths, </a:t>
+            </a:r>
+            <a:r>
+              <a:rPr lang="en-US" u="sng" dirty="0">
+                <a:solidFill>
+                  <a:schemeClr val="bg1"/>
+                </a:solidFill>
+              </a:rPr>
+              <a:t>lower cells</a:t>
+            </a:r>
+            <a:r>
+              <a:rPr lang="en-US" dirty="0">
+                <a:solidFill>
+                  <a:schemeClr val="bg1"/>
+                </a:solidFill>
+              </a:rPr>
+              <a:t> to deal with “holes”</a:t>
+            </a:r>
+          </a:p>
+          <a:p>
+            <a:r>
+              <a:rPr lang="en-US" dirty="0">
+                <a:solidFill>
+                  <a:schemeClr val="bg1"/>
+                </a:solidFill>
+              </a:rPr>
+              <a:t>Use conditioned DEM to develop streams using </a:t>
+            </a:r>
+            <a:r>
+              <a:rPr lang="en-US" dirty="0" err="1">
+                <a:solidFill>
+                  <a:schemeClr val="bg1"/>
+                </a:solidFill>
+              </a:rPr>
+              <a:t>ArcHydro</a:t>
+            </a:r>
+            <a:r>
+              <a:rPr lang="en-US" dirty="0">
+                <a:solidFill>
+                  <a:schemeClr val="bg1"/>
+                </a:solidFill>
+              </a:rPr>
+              <a:t> (FD+FA)</a:t>
+            </a:r>
+          </a:p>
+        </p:txBody>
+      </p:sp>
+      <p:sp>
+        <p:nvSpPr>
+          <p:cNvPr id="10" name="TextBox 9">
+            <a:extLst>
+              <a:ext uri="{FF2B5EF4-FFF2-40B4-BE49-F238E27FC236}">
+                <a16:creationId xmlns:a16="http://schemas.microsoft.com/office/drawing/2014/main" id="{87FAF9D3-775C-4C95-AC68-BC9ABF8C1EFE}"/>
+              </a:ext>
+            </a:extLst>
+          </p:cNvPr>
+          <p:cNvSpPr txBox="1"/>
+          <p:nvPr/>
+        </p:nvSpPr>
+        <p:spPr>
+          <a:xfrm>
+            <a:off x="4753588" y="6216352"/>
+            <a:ext cx="1781257" cy="461665"/>
+          </a:xfrm>
+          <a:prstGeom prst="rect">
+            <a:avLst/>
+          </a:prstGeom>
+          <a:noFill/>
+          <a:ln>
+            <a:noFill/>
+          </a:ln>
+        </p:spPr>
+        <p:txBody>
+          <a:bodyPr wrap="none" rtlCol="0">
+            <a:spAutoFit/>
+          </a:bodyPr>
+          <a:lstStyle/>
+          <a:p>
+            <a:r>
+              <a:rPr lang="en-US" dirty="0">
+                <a:solidFill>
+                  <a:schemeClr val="bg1"/>
+                </a:solidFill>
+              </a:rPr>
+              <a:t>Much better!</a:t>
+            </a:r>
+          </a:p>
+        </p:txBody>
+      </p:sp>
+      <p:cxnSp>
+        <p:nvCxnSpPr>
+          <p:cNvPr id="11" name="Straight Arrow Connector 10">
+            <a:extLst>
+              <a:ext uri="{FF2B5EF4-FFF2-40B4-BE49-F238E27FC236}">
+                <a16:creationId xmlns:a16="http://schemas.microsoft.com/office/drawing/2014/main" id="{1BAA5A16-3235-48F6-BBC5-53FDCDF68ED0}"/>
+              </a:ext>
+            </a:extLst>
+          </p:cNvPr>
+          <p:cNvCxnSpPr/>
+          <p:nvPr/>
+        </p:nvCxnSpPr>
+        <p:spPr>
+          <a:xfrm flipH="1" flipV="1">
+            <a:off x="3801088" y="6140152"/>
+            <a:ext cx="800100" cy="304801"/>
+          </a:xfrm>
+          <a:prstGeom prst="straightConnector1">
+            <a:avLst/>
+          </a:prstGeom>
+          <a:ln w="28575">
+            <a:solidFill>
+              <a:srgbClr val="FF0000"/>
+            </a:solidFill>
+            <a:tailEnd type="arrow"/>
+          </a:ln>
+        </p:spPr>
+        <p:style>
+          <a:lnRef idx="1">
+            <a:schemeClr val="accent1"/>
+          </a:lnRef>
+          <a:fillRef idx="0">
+            <a:schemeClr val="accent1"/>
+          </a:fillRef>
+          <a:effectRef idx="0">
+            <a:schemeClr val="accent1"/>
+          </a:effectRef>
+          <a:fontRef idx="minor">
+            <a:schemeClr val="tx1"/>
+          </a:fontRef>
+        </p:style>
+      </p:cxnSp>
+    </p:spTree>
+    <p:extLst>
+      <p:ext uri="{BB962C8B-B14F-4D97-AF65-F5344CB8AC3E}">
+        <p14:creationId xmlns:p14="http://schemas.microsoft.com/office/powerpoint/2010/main" val="3726290282"/>
+      </p:ext>
+    </p:extLst>
+  </p:cSld>
+  <p:clrMapOvr>
+    <a:masterClrMapping/>
+  </p:clrMapOvr>
+  <p:transition/>
+</p:sld>
+</file>
+
+<file path=ppt/slides/slide15.xml><?xml version="1.0" encoding="utf-8"?>
+<p:sld xmlns:a="http://schemas.openxmlformats.org/drawingml/2006/main" xmlns:r="http://schemas.openxmlformats.org/officeDocument/2006/relationships" xmlns:p="http://schemas.openxmlformats.org/presentationml/2006/main">
+  <p:cSld>
+    <p:spTree>
+      <p:nvGrpSpPr>
+        <p:cNvPr id="1" name=""/>
+        <p:cNvGrpSpPr/>
+        <p:nvPr/>
+      </p:nvGrpSpPr>
+      <p:grpSpPr>
+        <a:xfrm>
+          <a:off x="0" y="0"/>
+          <a:ext cx="0" cy="0"/>
+          <a:chOff x="0" y="0"/>
+          <a:chExt cx="0" cy="0"/>
+        </a:xfrm>
+      </p:grpSpPr>
+      <p:sp>
+        <p:nvSpPr>
+          <p:cNvPr id="238594" name="Rectangle 2"/>
+          <p:cNvSpPr>
+            <a:spLocks noGrp="1" noChangeArrowheads="1"/>
+          </p:cNvSpPr>
+          <p:nvPr>
+            <p:ph type="title"/>
+          </p:nvPr>
+        </p:nvSpPr>
+        <p:spPr>
+          <a:xfrm>
+            <a:off x="-1174480" y="556663"/>
+            <a:ext cx="7772400" cy="1143000"/>
+          </a:xfrm>
+        </p:spPr>
+        <p:txBody>
+          <a:bodyPr>
+            <a:normAutofit/>
+          </a:bodyPr>
+          <a:lstStyle/>
+          <a:p>
+            <a:pPr eaLnBrk="1" hangingPunct="1">
+              <a:defRPr/>
+            </a:pPr>
+            <a:r>
+              <a:rPr lang="en-US" sz="4000" dirty="0">
+                <a:solidFill>
+                  <a:schemeClr val="bg1"/>
+                </a:solidFill>
+              </a:rPr>
+              <a:t>New SFR2 Features</a:t>
+            </a:r>
+          </a:p>
+        </p:txBody>
+      </p:sp>
+      <p:pic>
+        <p:nvPicPr>
+          <p:cNvPr id="7" name="Picture 2">
+            <a:extLst>
+              <a:ext uri="{FF2B5EF4-FFF2-40B4-BE49-F238E27FC236}">
+                <a16:creationId xmlns:a16="http://schemas.microsoft.com/office/drawing/2014/main" id="{045BEE6F-154B-4E2A-9155-84FDA229D0AB}"/>
+              </a:ext>
+            </a:extLst>
+          </p:cNvPr>
+          <p:cNvPicPr>
+            <a:picLocks noChangeAspect="1" noChangeArrowheads="1"/>
+          </p:cNvPicPr>
+          <p:nvPr/>
+        </p:nvPicPr>
+        <p:blipFill>
+          <a:blip r:embed="rId2">
+            <a:extLst>
+              <a:ext uri="{28A0092B-C50C-407E-A947-70E740481C1C}">
+                <a14:useLocalDpi xmlns:a14="http://schemas.microsoft.com/office/drawing/2010/main" val="0"/>
+              </a:ext>
+            </a:extLst>
+          </a:blip>
+          <a:srcRect/>
+          <a:stretch>
+            <a:fillRect/>
+          </a:stretch>
+        </p:blipFill>
+        <p:spPr bwMode="auto">
+          <a:xfrm>
+            <a:off x="5834920" y="716549"/>
+            <a:ext cx="2684240" cy="4038599"/>
+          </a:xfrm>
+          <a:prstGeom prst="rect">
+            <a:avLst/>
+          </a:prstGeom>
+          <a:noFill/>
+          <a:ln>
+            <a:noFill/>
+          </a:ln>
+          <a:extLst>
+            <a:ext uri="{909E8E84-426E-40DD-AFC4-6F175D3DCCD1}">
+              <a14:hiddenFill xmlns:a14="http://schemas.microsoft.com/office/drawing/2010/main">
+                <a:solidFill>
+                  <a:schemeClr val="accent1"/>
+                </a:solidFill>
+              </a14:hiddenFill>
+            </a:ext>
+            <a:ext uri="{91240B29-F687-4F45-9708-019B960494DF}">
+              <a14:hiddenLine xmlns:a14="http://schemas.microsoft.com/office/drawing/2010/main" w="9525">
+                <a:solidFill>
+                  <a:schemeClr val="tx1"/>
+                </a:solidFill>
+                <a:miter lim="800000"/>
+                <a:headEnd/>
+                <a:tailEnd/>
+              </a14:hiddenLine>
+            </a:ext>
+          </a:extLst>
+        </p:spPr>
       </p:pic>
+      <p:sp>
+        <p:nvSpPr>
+          <p:cNvPr id="6" name="Rectangle 5">
+            <a:extLst>
+              <a:ext uri="{FF2B5EF4-FFF2-40B4-BE49-F238E27FC236}">
+                <a16:creationId xmlns:a16="http://schemas.microsoft.com/office/drawing/2014/main" id="{85C0DBF9-C0AB-4A67-8F68-51A3E61AADAE}"/>
+              </a:ext>
+            </a:extLst>
+          </p:cNvPr>
+          <p:cNvSpPr/>
+          <p:nvPr/>
+        </p:nvSpPr>
+        <p:spPr>
+          <a:xfrm>
+            <a:off x="624840" y="2598003"/>
+            <a:ext cx="4572000" cy="830997"/>
+          </a:xfrm>
+          <a:prstGeom prst="rect">
+            <a:avLst/>
+          </a:prstGeom>
+        </p:spPr>
+        <p:txBody>
+          <a:bodyPr>
+            <a:spAutoFit/>
+          </a:bodyPr>
+          <a:lstStyle/>
+          <a:p>
+            <a:pPr eaLnBrk="1" hangingPunct="1"/>
+            <a:r>
+              <a:rPr lang="en-US" dirty="0">
+                <a:solidFill>
+                  <a:schemeClr val="bg1"/>
+                </a:solidFill>
+              </a:rPr>
+              <a:t>Time series inflow to stream reach (can be any arbitrary time interval)</a:t>
+            </a:r>
+          </a:p>
+        </p:txBody>
+      </p:sp>
+      <p:sp>
+        <p:nvSpPr>
+          <p:cNvPr id="8" name="TextBox 7">
+            <a:extLst>
+              <a:ext uri="{FF2B5EF4-FFF2-40B4-BE49-F238E27FC236}">
+                <a16:creationId xmlns:a16="http://schemas.microsoft.com/office/drawing/2014/main" id="{9101C75E-909C-4A4B-9EE1-96C7A96CE79C}"/>
+              </a:ext>
+            </a:extLst>
+          </p:cNvPr>
+          <p:cNvSpPr txBox="1"/>
+          <p:nvPr/>
+        </p:nvSpPr>
+        <p:spPr>
+          <a:xfrm>
+            <a:off x="468654" y="4755148"/>
+            <a:ext cx="6515886" cy="1200329"/>
+          </a:xfrm>
+          <a:prstGeom prst="rect">
+            <a:avLst/>
+          </a:prstGeom>
+          <a:noFill/>
+        </p:spPr>
+        <p:txBody>
+          <a:bodyPr wrap="none" rtlCol="0">
+            <a:spAutoFit/>
+          </a:bodyPr>
+          <a:lstStyle/>
+          <a:p>
+            <a:r>
+              <a:rPr lang="en-US" dirty="0">
+                <a:solidFill>
+                  <a:schemeClr val="bg1"/>
+                </a:solidFill>
+              </a:rPr>
+              <a:t>OPTIONS</a:t>
+            </a:r>
+          </a:p>
+          <a:p>
+            <a:r>
+              <a:rPr lang="en-US" dirty="0" err="1">
+                <a:solidFill>
+                  <a:schemeClr val="bg1"/>
+                </a:solidFill>
+              </a:rPr>
+              <a:t>Tabfiles</a:t>
+            </a:r>
+            <a:r>
+              <a:rPr lang="en-US" dirty="0">
+                <a:solidFill>
+                  <a:schemeClr val="bg1"/>
+                </a:solidFill>
+              </a:rPr>
+              <a:t>    716    13219    #</a:t>
+            </a:r>
+            <a:r>
+              <a:rPr lang="en-US" dirty="0" err="1">
+                <a:solidFill>
+                  <a:schemeClr val="bg1"/>
+                </a:solidFill>
+              </a:rPr>
+              <a:t>tabfiles</a:t>
+            </a:r>
+            <a:r>
+              <a:rPr lang="en-US" dirty="0">
+                <a:solidFill>
+                  <a:schemeClr val="bg1"/>
+                </a:solidFill>
+              </a:rPr>
+              <a:t>, </a:t>
+            </a:r>
+            <a:r>
+              <a:rPr lang="en-US" dirty="0" err="1">
+                <a:solidFill>
+                  <a:schemeClr val="bg1"/>
+                </a:solidFill>
+              </a:rPr>
+              <a:t>numtab</a:t>
+            </a:r>
+            <a:r>
+              <a:rPr lang="en-US" dirty="0">
+                <a:solidFill>
+                  <a:schemeClr val="bg1"/>
+                </a:solidFill>
+              </a:rPr>
+              <a:t>, </a:t>
+            </a:r>
+            <a:r>
+              <a:rPr lang="en-US" dirty="0" err="1">
+                <a:solidFill>
+                  <a:schemeClr val="bg1"/>
+                </a:solidFill>
+              </a:rPr>
+              <a:t>maxval</a:t>
+            </a:r>
+            <a:endParaRPr lang="en-US" dirty="0">
+              <a:solidFill>
+                <a:schemeClr val="bg1"/>
+              </a:solidFill>
+            </a:endParaRPr>
+          </a:p>
+          <a:p>
+            <a:r>
+              <a:rPr lang="en-US" dirty="0">
+                <a:solidFill>
+                  <a:schemeClr val="bg1"/>
+                </a:solidFill>
+              </a:rPr>
+              <a:t>END</a:t>
+            </a:r>
+          </a:p>
+        </p:txBody>
+      </p:sp>
     </p:spTree>
     <p:extLst>
       <p:ext uri="{BB962C8B-B14F-4D97-AF65-F5344CB8AC3E}">
@@ -5609,7 +6363,7 @@
 </p:sld>
 </file>
 
-<file path=ppt/slides/slide15.xml><?xml version="1.0" encoding="utf-8"?>
+<file path=ppt/slides/slide16.xml><?xml version="1.0" encoding="utf-8"?>
 <p:sld xmlns:a="http://schemas.openxmlformats.org/drawingml/2006/main" xmlns:r="http://schemas.openxmlformats.org/officeDocument/2006/relationships" xmlns:p="http://schemas.openxmlformats.org/presentationml/2006/main">
   <p:cSld>
     <p:spTree>
@@ -5818,7 +6572,7 @@
 </p:sld>
 </file>
 
-<file path=ppt/slides/slide16.xml><?xml version="1.0" encoding="utf-8"?>
+<file path=ppt/slides/slide17.xml><?xml version="1.0" encoding="utf-8"?>
 <p:sld xmlns:a="http://schemas.openxmlformats.org/drawingml/2006/main" xmlns:r="http://schemas.openxmlformats.org/officeDocument/2006/relationships" xmlns:p="http://schemas.openxmlformats.org/presentationml/2006/main">
   <p:cSld>
     <p:spTree>
@@ -16008,7 +16762,7 @@
           <a:graphicData uri="http://schemas.openxmlformats.org/presentationml/2006/ole">
             <mc:AlternateContent xmlns:mc="http://schemas.openxmlformats.org/markup-compatibility/2006">
               <mc:Choice xmlns:v="urn:schemas-microsoft-com:vml" Requires="v">
-                <p:oleObj spid="_x0000_s1042" name="Equation" r:id="rId3" imgW="2425680" imgH="482400" progId="Equation.3">
+                <p:oleObj spid="_x0000_s1050" name="Equation" r:id="rId3" imgW="2425680" imgH="482400" progId="Equation.3">
                   <p:embed/>
                 </p:oleObj>
               </mc:Choice>
@@ -16090,7 +16844,7 @@
           <a:graphicData uri="http://schemas.openxmlformats.org/presentationml/2006/ole">
             <mc:AlternateContent xmlns:mc="http://schemas.openxmlformats.org/markup-compatibility/2006">
               <mc:Choice xmlns:v="urn:schemas-microsoft-com:vml" Requires="v">
-                <p:oleObj spid="_x0000_s1043" name="Equation" r:id="rId5" imgW="1473120" imgH="190440" progId="Equation.3">
+                <p:oleObj spid="_x0000_s1051" name="Equation" r:id="rId5" imgW="1473120" imgH="190440" progId="Equation.3">
                   <p:embed/>
                 </p:oleObj>
               </mc:Choice>
@@ -19315,7 +20069,7 @@
           <a:graphicData uri="http://schemas.openxmlformats.org/presentationml/2006/ole">
             <mc:AlternateContent xmlns:mc="http://schemas.openxmlformats.org/markup-compatibility/2006">
               <mc:Choice xmlns:v="urn:schemas-microsoft-com:vml" Requires="v">
-                <p:oleObj spid="_x0000_s2058" name="Equation" r:id="rId3" imgW="2425680" imgH="482400" progId="Equation.3">
+                <p:oleObj spid="_x0000_s2066" name="Equation" r:id="rId3" imgW="2425680" imgH="482400" progId="Equation.3">
                   <p:embed/>
                 </p:oleObj>
               </mc:Choice>
@@ -19750,7 +20504,7 @@
           <a:graphicData uri="http://schemas.openxmlformats.org/presentationml/2006/ole">
             <mc:AlternateContent xmlns:mc="http://schemas.openxmlformats.org/markup-compatibility/2006">
               <mc:Choice xmlns:v="urn:schemas-microsoft-com:vml" Requires="v">
-                <p:oleObj spid="_x0000_s2059" name="Equation" r:id="rId5" imgW="1244520" imgH="203040" progId="Equation.3">
+                <p:oleObj spid="_x0000_s2067" name="Equation" r:id="rId5" imgW="1244520" imgH="203040" progId="Equation.3">
                   <p:embed/>
                 </p:oleObj>
               </mc:Choice>

</xml_diff>